<commit_message>
MAJ CSS et HTML
</commit_message>
<xml_diff>
--- a/Présentation Projet 2 - Reservia.pptx
+++ b/Présentation Projet 2 - Reservia.pptx
@@ -259,7 +259,7 @@
           <a:p>
             <a:fld id="{442EA2D9-9B80-D345-9405-D5A7F6BF5314}" type="datetimeFigureOut">
               <a:rPr lang="fr-FR" smtClean="0"/>
-              <a:t>23/02/2021</a:t>
+              <a:t>24/02/2021</a:t>
             </a:fld>
             <a:endParaRPr lang="fr-FR" dirty="0"/>
           </a:p>
@@ -457,7 +457,7 @@
           <a:p>
             <a:fld id="{442EA2D9-9B80-D345-9405-D5A7F6BF5314}" type="datetimeFigureOut">
               <a:rPr lang="fr-FR" smtClean="0"/>
-              <a:t>23/02/2021</a:t>
+              <a:t>24/02/2021</a:t>
             </a:fld>
             <a:endParaRPr lang="fr-FR" dirty="0"/>
           </a:p>
@@ -665,7 +665,7 @@
           <a:p>
             <a:fld id="{442EA2D9-9B80-D345-9405-D5A7F6BF5314}" type="datetimeFigureOut">
               <a:rPr lang="fr-FR" smtClean="0"/>
-              <a:t>23/02/2021</a:t>
+              <a:t>24/02/2021</a:t>
             </a:fld>
             <a:endParaRPr lang="fr-FR" dirty="0"/>
           </a:p>
@@ -863,7 +863,7 @@
           <a:p>
             <a:fld id="{442EA2D9-9B80-D345-9405-D5A7F6BF5314}" type="datetimeFigureOut">
               <a:rPr lang="fr-FR" smtClean="0"/>
-              <a:t>23/02/2021</a:t>
+              <a:t>24/02/2021</a:t>
             </a:fld>
             <a:endParaRPr lang="fr-FR" dirty="0"/>
           </a:p>
@@ -1138,7 +1138,7 @@
           <a:p>
             <a:fld id="{442EA2D9-9B80-D345-9405-D5A7F6BF5314}" type="datetimeFigureOut">
               <a:rPr lang="fr-FR" smtClean="0"/>
-              <a:t>23/02/2021</a:t>
+              <a:t>24/02/2021</a:t>
             </a:fld>
             <a:endParaRPr lang="fr-FR" dirty="0"/>
           </a:p>
@@ -1403,7 +1403,7 @@
           <a:p>
             <a:fld id="{442EA2D9-9B80-D345-9405-D5A7F6BF5314}" type="datetimeFigureOut">
               <a:rPr lang="fr-FR" smtClean="0"/>
-              <a:t>23/02/2021</a:t>
+              <a:t>24/02/2021</a:t>
             </a:fld>
             <a:endParaRPr lang="fr-FR" dirty="0"/>
           </a:p>
@@ -1815,7 +1815,7 @@
           <a:p>
             <a:fld id="{442EA2D9-9B80-D345-9405-D5A7F6BF5314}" type="datetimeFigureOut">
               <a:rPr lang="fr-FR" smtClean="0"/>
-              <a:t>23/02/2021</a:t>
+              <a:t>24/02/2021</a:t>
             </a:fld>
             <a:endParaRPr lang="fr-FR" dirty="0"/>
           </a:p>
@@ -1956,7 +1956,7 @@
           <a:p>
             <a:fld id="{442EA2D9-9B80-D345-9405-D5A7F6BF5314}" type="datetimeFigureOut">
               <a:rPr lang="fr-FR" smtClean="0"/>
-              <a:t>23/02/2021</a:t>
+              <a:t>24/02/2021</a:t>
             </a:fld>
             <a:endParaRPr lang="fr-FR" dirty="0"/>
           </a:p>
@@ -2069,7 +2069,7 @@
           <a:p>
             <a:fld id="{442EA2D9-9B80-D345-9405-D5A7F6BF5314}" type="datetimeFigureOut">
               <a:rPr lang="fr-FR" smtClean="0"/>
-              <a:t>23/02/2021</a:t>
+              <a:t>24/02/2021</a:t>
             </a:fld>
             <a:endParaRPr lang="fr-FR" dirty="0"/>
           </a:p>
@@ -2380,7 +2380,7 @@
           <a:p>
             <a:fld id="{442EA2D9-9B80-D345-9405-D5A7F6BF5314}" type="datetimeFigureOut">
               <a:rPr lang="fr-FR" smtClean="0"/>
-              <a:t>23/02/2021</a:t>
+              <a:t>24/02/2021</a:t>
             </a:fld>
             <a:endParaRPr lang="fr-FR" dirty="0"/>
           </a:p>
@@ -2668,7 +2668,7 @@
           <a:p>
             <a:fld id="{442EA2D9-9B80-D345-9405-D5A7F6BF5314}" type="datetimeFigureOut">
               <a:rPr lang="fr-FR" smtClean="0"/>
-              <a:t>23/02/2021</a:t>
+              <a:t>24/02/2021</a:t>
             </a:fld>
             <a:endParaRPr lang="fr-FR" dirty="0"/>
           </a:p>
@@ -2909,7 +2909,7 @@
           <a:p>
             <a:fld id="{442EA2D9-9B80-D345-9405-D5A7F6BF5314}" type="datetimeFigureOut">
               <a:rPr lang="fr-FR" smtClean="0"/>
-              <a:t>23/02/2021</a:t>
+              <a:t>24/02/2021</a:t>
             </a:fld>
             <a:endParaRPr lang="fr-FR" dirty="0"/>
           </a:p>
@@ -3814,27 +3814,7 @@
                 <a:latin typeface="Avenir Book" panose="02000503020000020003" pitchFamily="2" charset="0"/>
                 <a:cs typeface="Apple Chancery" panose="03020702040506060504" pitchFamily="66" charset="-79"/>
               </a:rPr>
-              <a:t> : Intégration d’une maquette responsive HTML et CSS sur la base du Material Design proposé par </a:t>
-            </a:r>
-            <a:r>
-              <a:rPr lang="en-US" sz="1200" dirty="0" err="1">
-                <a:solidFill>
-                  <a:srgbClr val="000000"/>
-                </a:solidFill>
-                <a:latin typeface="Avenir Book" panose="02000503020000020003" pitchFamily="2" charset="0"/>
-                <a:cs typeface="Apple Chancery" panose="03020702040506060504" pitchFamily="66" charset="-79"/>
-              </a:rPr>
-              <a:t>Loic</a:t>
-            </a:r>
-            <a:r>
-              <a:rPr lang="en-US" sz="1200" dirty="0">
-                <a:solidFill>
-                  <a:srgbClr val="000000"/>
-                </a:solidFill>
-                <a:latin typeface="Avenir Book" panose="02000503020000020003" pitchFamily="2" charset="0"/>
-                <a:cs typeface="Apple Chancery" panose="03020702040506060504" pitchFamily="66" charset="-79"/>
-              </a:rPr>
-              <a:t> (UI designer)</a:t>
+              <a:t> : Intégration d’une maquette responsive HTML et CSS sur la base du Material Design proposé par Loic (UI designer)</a:t>
             </a:r>
           </a:p>
           <a:p>

</xml_diff>